<commit_message>
setting the environment and secrets
</commit_message>
<xml_diff>
--- a/DBT training.pptx
+++ b/DBT training.pptx
@@ -7293,7 +7293,9 @@
           </a:xfrm>
         </p:spPr>
         <p:txBody>
-          <a:bodyPr/>
+          <a:bodyPr>
+            <a:normAutofit lnSpcReduction="10000"/>
+          </a:bodyPr>
           <a:lstStyle/>
           <a:p>
             <a:r>
@@ -7319,6 +7321,80 @@
           </a:p>
           <a:p>
             <a:endParaRPr lang="en-IN" dirty="0"/>
+          </a:p>
+          <a:p>
+            <a:endParaRPr lang="en-IN" dirty="0"/>
+          </a:p>
+          <a:p>
+            <a:r>
+              <a:rPr lang="en-US" b="0" i="0" dirty="0">
+                <a:solidFill>
+                  <a:srgbClr val="001D35"/>
+                </a:solidFill>
+                <a:effectLst/>
+                <a:latin typeface="Google Sans"/>
+              </a:rPr>
+              <a:t>Continuous integration (CI) is </a:t>
+            </a:r>
+            <a:r>
+              <a:rPr lang="en-US" b="1" i="0" dirty="0">
+                <a:solidFill>
+                  <a:srgbClr val="001D35"/>
+                </a:solidFill>
+                <a:effectLst/>
+                <a:latin typeface="Google Sans"/>
+              </a:rPr>
+              <a:t>a software development practice where developers merge their changes to a shared repository multiple times a day</a:t>
+            </a:r>
+            <a:r>
+              <a:rPr lang="en-US" b="0" i="0" dirty="0">
+                <a:solidFill>
+                  <a:srgbClr val="001D35"/>
+                </a:solidFill>
+                <a:effectLst/>
+                <a:latin typeface="Google Sans"/>
+              </a:rPr>
+              <a:t>.</a:t>
+            </a:r>
+            <a:endParaRPr lang="en-IN" b="0" i="0" dirty="0">
+              <a:solidFill>
+                <a:srgbClr val="001D35"/>
+              </a:solidFill>
+              <a:effectLst/>
+              <a:latin typeface="Google Sans"/>
+            </a:endParaRPr>
+          </a:p>
+          <a:p>
+            <a:pPr algn="l">
+              <a:buFont typeface="Arial" panose="020B0604020202020204" pitchFamily="34" charset="0"/>
+              <a:buChar char="•"/>
+            </a:pPr>
+            <a:r>
+              <a:rPr lang="en-US" b="0" i="0" dirty="0">
+                <a:solidFill>
+                  <a:srgbClr val="001D35"/>
+                </a:solidFill>
+                <a:effectLst/>
+                <a:latin typeface="Google Sans"/>
+              </a:rPr>
+              <a:t>Regularly merging small code changes is typically a more accurate and safer process.</a:t>
+            </a:r>
+          </a:p>
+          <a:p>
+            <a:pPr algn="l">
+              <a:buFont typeface="Arial" panose="020B0604020202020204" pitchFamily="34" charset="0"/>
+              <a:buChar char="•"/>
+            </a:pPr>
+            <a:r>
+              <a:rPr lang="en-US" b="0" i="0">
+                <a:solidFill>
+                  <a:srgbClr val="001D35"/>
+                </a:solidFill>
+                <a:effectLst/>
+                <a:latin typeface="Google Sans"/>
+              </a:rPr>
+              <a:t>If any bugs are found in the merging process, they're easier and faster to find.</a:t>
+            </a:r>
           </a:p>
         </p:txBody>
       </p:sp>

</xml_diff>